<commit_message>
Subindo sem a hooks do slack
</commit_message>
<xml_diff>
--- a/Análise de Sistemas/Diagrama de Solução de Software.pptx
+++ b/Análise de Sistemas/Diagrama de Solução de Software.pptx
@@ -5,10 +5,11 @@
     <p:sldMasterId id="2147483648" r:id="rId1"/>
   </p:sldMasterIdLst>
   <p:notesMasterIdLst>
-    <p:notesMasterId r:id="rId3"/>
+    <p:notesMasterId r:id="rId4"/>
   </p:notesMasterIdLst>
   <p:sldIdLst>
     <p:sldId id="256" r:id="rId2"/>
+    <p:sldId id="257" r:id="rId3"/>
   </p:sldIdLst>
   <p:sldSz cx="12192000" cy="6858000"/>
   <p:notesSz cx="6858000" cy="9144000"/>
@@ -107,6 +108,11 @@
       </a:defRPr>
     </a:lvl9pPr>
   </p:defaultTextStyle>
+  <p:extLst>
+    <p:ext uri="{EFAFB233-063F-42B5-8137-9DF3F51BA10A}">
+      <p15:sldGuideLst xmlns:p15="http://schemas.microsoft.com/office/powerpoint/2012/main"/>
+    </p:ext>
+  </p:extLst>
 </p:presentation>
 </file>
 
@@ -192,7 +198,7 @@
           <a:p>
             <a:fld id="{B299F7BA-D7E4-4C5B-B729-0E1DFD1B1C2B}" type="datetimeFigureOut">
               <a:rPr lang="pt-BR" smtClean="0"/>
-              <a:t>08/10/2021</a:t>
+              <a:t>24/11/2021</a:t>
             </a:fld>
             <a:endParaRPr lang="pt-BR"/>
           </a:p>
@@ -546,6 +552,90 @@
 </p:notes>
 </file>
 
+<file path=ppt/notesSlides/notesSlide2.xml><?xml version="1.0" encoding="utf-8"?>
+<p:notes xmlns:a="http://schemas.openxmlformats.org/drawingml/2006/main" xmlns:r="http://schemas.openxmlformats.org/officeDocument/2006/relationships" xmlns:p="http://schemas.openxmlformats.org/presentationml/2006/main">
+  <p:cSld>
+    <p:spTree>
+      <p:nvGrpSpPr>
+        <p:cNvPr id="1" name=""/>
+        <p:cNvGrpSpPr/>
+        <p:nvPr/>
+      </p:nvGrpSpPr>
+      <p:grpSpPr>
+        <a:xfrm>
+          <a:off x="0" y="0"/>
+          <a:ext cx="0" cy="0"/>
+          <a:chOff x="0" y="0"/>
+          <a:chExt cx="0" cy="0"/>
+        </a:xfrm>
+      </p:grpSpPr>
+      <p:sp>
+        <p:nvSpPr>
+          <p:cNvPr id="2" name="Espaço Reservado para Imagem de Slide 1"/>
+          <p:cNvSpPr>
+            <a:spLocks noGrp="1" noRot="1" noChangeAspect="1"/>
+          </p:cNvSpPr>
+          <p:nvPr>
+            <p:ph type="sldImg"/>
+          </p:nvPr>
+        </p:nvSpPr>
+        <p:spPr/>
+      </p:sp>
+      <p:sp>
+        <p:nvSpPr>
+          <p:cNvPr id="3" name="Espaço Reservado para Anotações 2"/>
+          <p:cNvSpPr>
+            <a:spLocks noGrp="1"/>
+          </p:cNvSpPr>
+          <p:nvPr>
+            <p:ph type="body" idx="1"/>
+          </p:nvPr>
+        </p:nvSpPr>
+        <p:spPr/>
+        <p:txBody>
+          <a:bodyPr/>
+          <a:lstStyle/>
+          <a:p>
+            <a:endParaRPr lang="pt-BR" dirty="0"/>
+          </a:p>
+        </p:txBody>
+      </p:sp>
+      <p:sp>
+        <p:nvSpPr>
+          <p:cNvPr id="4" name="Espaço Reservado para Número de Slide 3"/>
+          <p:cNvSpPr>
+            <a:spLocks noGrp="1"/>
+          </p:cNvSpPr>
+          <p:nvPr>
+            <p:ph type="sldNum" sz="quarter" idx="5"/>
+          </p:nvPr>
+        </p:nvSpPr>
+        <p:spPr/>
+        <p:txBody>
+          <a:bodyPr/>
+          <a:lstStyle/>
+          <a:p>
+            <a:fld id="{1F2BC2DD-4D1F-41F2-8083-E7EBE3EE56AA}" type="slidenum">
+              <a:rPr lang="pt-BR" smtClean="0"/>
+              <a:t>2</a:t>
+            </a:fld>
+            <a:endParaRPr lang="pt-BR"/>
+          </a:p>
+        </p:txBody>
+      </p:sp>
+    </p:spTree>
+    <p:extLst>
+      <p:ext uri="{BB962C8B-B14F-4D97-AF65-F5344CB8AC3E}">
+        <p14:creationId xmlns:p14="http://schemas.microsoft.com/office/powerpoint/2010/main" val="1843778214"/>
+      </p:ext>
+    </p:extLst>
+  </p:cSld>
+  <p:clrMapOvr>
+    <a:masterClrMapping/>
+  </p:clrMapOvr>
+</p:notes>
+</file>
+
 <file path=ppt/slideLayouts/slideLayout1.xml><?xml version="1.0" encoding="utf-8"?>
 <p:sldLayout xmlns:a="http://schemas.openxmlformats.org/drawingml/2006/main" xmlns:r="http://schemas.openxmlformats.org/officeDocument/2006/relationships" xmlns:p="http://schemas.openxmlformats.org/presentationml/2006/main" type="title" preserve="1">
   <p:cSld name="Slide de Título">
@@ -693,7 +783,7 @@
           <a:p>
             <a:fld id="{DC1C5007-BE1C-463B-9CE3-180DA1310E1E}" type="datetimeFigureOut">
               <a:rPr lang="pt-BR" smtClean="0"/>
-              <a:t>08/10/2021</a:t>
+              <a:t>24/11/2021</a:t>
             </a:fld>
             <a:endParaRPr lang="pt-BR"/>
           </a:p>
@@ -891,7 +981,7 @@
           <a:p>
             <a:fld id="{DC1C5007-BE1C-463B-9CE3-180DA1310E1E}" type="datetimeFigureOut">
               <a:rPr lang="pt-BR" smtClean="0"/>
-              <a:t>08/10/2021</a:t>
+              <a:t>24/11/2021</a:t>
             </a:fld>
             <a:endParaRPr lang="pt-BR"/>
           </a:p>
@@ -1099,7 +1189,7 @@
           <a:p>
             <a:fld id="{DC1C5007-BE1C-463B-9CE3-180DA1310E1E}" type="datetimeFigureOut">
               <a:rPr lang="pt-BR" smtClean="0"/>
-              <a:t>08/10/2021</a:t>
+              <a:t>24/11/2021</a:t>
             </a:fld>
             <a:endParaRPr lang="pt-BR"/>
           </a:p>
@@ -1297,7 +1387,7 @@
           <a:p>
             <a:fld id="{DC1C5007-BE1C-463B-9CE3-180DA1310E1E}" type="datetimeFigureOut">
               <a:rPr lang="pt-BR" smtClean="0"/>
-              <a:t>08/10/2021</a:t>
+              <a:t>24/11/2021</a:t>
             </a:fld>
             <a:endParaRPr lang="pt-BR"/>
           </a:p>
@@ -1572,7 +1662,7 @@
           <a:p>
             <a:fld id="{DC1C5007-BE1C-463B-9CE3-180DA1310E1E}" type="datetimeFigureOut">
               <a:rPr lang="pt-BR" smtClean="0"/>
-              <a:t>08/10/2021</a:t>
+              <a:t>24/11/2021</a:t>
             </a:fld>
             <a:endParaRPr lang="pt-BR"/>
           </a:p>
@@ -1837,7 +1927,7 @@
           <a:p>
             <a:fld id="{DC1C5007-BE1C-463B-9CE3-180DA1310E1E}" type="datetimeFigureOut">
               <a:rPr lang="pt-BR" smtClean="0"/>
-              <a:t>08/10/2021</a:t>
+              <a:t>24/11/2021</a:t>
             </a:fld>
             <a:endParaRPr lang="pt-BR"/>
           </a:p>
@@ -2249,7 +2339,7 @@
           <a:p>
             <a:fld id="{DC1C5007-BE1C-463B-9CE3-180DA1310E1E}" type="datetimeFigureOut">
               <a:rPr lang="pt-BR" smtClean="0"/>
-              <a:t>08/10/2021</a:t>
+              <a:t>24/11/2021</a:t>
             </a:fld>
             <a:endParaRPr lang="pt-BR"/>
           </a:p>
@@ -2390,7 +2480,7 @@
           <a:p>
             <a:fld id="{DC1C5007-BE1C-463B-9CE3-180DA1310E1E}" type="datetimeFigureOut">
               <a:rPr lang="pt-BR" smtClean="0"/>
-              <a:t>08/10/2021</a:t>
+              <a:t>24/11/2021</a:t>
             </a:fld>
             <a:endParaRPr lang="pt-BR"/>
           </a:p>
@@ -2503,7 +2593,7 @@
           <a:p>
             <a:fld id="{DC1C5007-BE1C-463B-9CE3-180DA1310E1E}" type="datetimeFigureOut">
               <a:rPr lang="pt-BR" smtClean="0"/>
-              <a:t>08/10/2021</a:t>
+              <a:t>24/11/2021</a:t>
             </a:fld>
             <a:endParaRPr lang="pt-BR"/>
           </a:p>
@@ -2814,7 +2904,7 @@
           <a:p>
             <a:fld id="{DC1C5007-BE1C-463B-9CE3-180DA1310E1E}" type="datetimeFigureOut">
               <a:rPr lang="pt-BR" smtClean="0"/>
-              <a:t>08/10/2021</a:t>
+              <a:t>24/11/2021</a:t>
             </a:fld>
             <a:endParaRPr lang="pt-BR"/>
           </a:p>
@@ -3102,7 +3192,7 @@
           <a:p>
             <a:fld id="{DC1C5007-BE1C-463B-9CE3-180DA1310E1E}" type="datetimeFigureOut">
               <a:rPr lang="pt-BR" smtClean="0"/>
-              <a:t>08/10/2021</a:t>
+              <a:t>24/11/2021</a:t>
             </a:fld>
             <a:endParaRPr lang="pt-BR"/>
           </a:p>
@@ -3343,7 +3433,7 @@
           <a:p>
             <a:fld id="{DC1C5007-BE1C-463B-9CE3-180DA1310E1E}" type="datetimeFigureOut">
               <a:rPr lang="pt-BR" smtClean="0"/>
-              <a:t>08/10/2021</a:t>
+              <a:t>24/11/2021</a:t>
             </a:fld>
             <a:endParaRPr lang="pt-BR"/>
           </a:p>
@@ -3762,10 +3852,10 @@
       </p:grpSpPr>
       <p:grpSp>
         <p:nvGrpSpPr>
-          <p:cNvPr id="41" name="Agrupar 40">
-            <a:extLst>
-              <a:ext uri="{FF2B5EF4-FFF2-40B4-BE49-F238E27FC236}">
-                <a16:creationId xmlns:a16="http://schemas.microsoft.com/office/drawing/2014/main" id="{05301DE6-3939-4646-AB67-7AA63A14FA32}"/>
+          <p:cNvPr id="71" name="Agrupar 70">
+            <a:extLst>
+              <a:ext uri="{FF2B5EF4-FFF2-40B4-BE49-F238E27FC236}">
+                <a16:creationId xmlns:a16="http://schemas.microsoft.com/office/drawing/2014/main" id="{647435B0-2D5F-404C-91CB-2B1420ABBBE2}"/>
               </a:ext>
             </a:extLst>
           </p:cNvPr>
@@ -3774,18 +3864,18 @@
         </p:nvGrpSpPr>
         <p:grpSpPr>
           <a:xfrm>
-            <a:off x="6806107" y="3786441"/>
-            <a:ext cx="4590809" cy="2895186"/>
-            <a:chOff x="6811085" y="3429000"/>
-            <a:chExt cx="4590809" cy="2895186"/>
+            <a:off x="6466439" y="3680049"/>
+            <a:ext cx="5298841" cy="3155039"/>
+            <a:chOff x="744025" y="-35695"/>
+            <a:chExt cx="10391335" cy="6040255"/>
           </a:xfrm>
         </p:grpSpPr>
         <p:pic>
           <p:nvPicPr>
-            <p:cNvPr id="10" name="Imagem 9" descr="Ícone&#10;&#10;Descrição gerada automaticamente">
+            <p:cNvPr id="73" name="Imagem 72" descr="Ícone&#10;&#10;Descrição gerada automaticamente">
               <a:extLst>
                 <a:ext uri="{FF2B5EF4-FFF2-40B4-BE49-F238E27FC236}">
-                  <a16:creationId xmlns:a16="http://schemas.microsoft.com/office/drawing/2014/main" id="{F064E115-FC58-469C-A386-DC574324C78B}"/>
+                  <a16:creationId xmlns:a16="http://schemas.microsoft.com/office/drawing/2014/main" id="{BDEE4022-ADD6-44DF-9DF7-680413FD668E}"/>
                 </a:ext>
               </a:extLst>
             </p:cNvPr>
@@ -3808,8 +3898,8 @@
           </p:blipFill>
           <p:spPr>
             <a:xfrm>
-              <a:off x="6811085" y="3429000"/>
-              <a:ext cx="4590809" cy="2895186"/>
+              <a:off x="744025" y="-35695"/>
+              <a:ext cx="10391335" cy="6040255"/>
             </a:xfrm>
             <a:prstGeom prst="rect">
               <a:avLst/>
@@ -3818,138 +3908,288 @@
         </p:pic>
         <p:sp>
           <p:nvSpPr>
-            <p:cNvPr id="11" name="CaixaDeTexto 10">
+            <p:cNvPr id="76" name="Retângulo 75">
               <a:extLst>
                 <a:ext uri="{FF2B5EF4-FFF2-40B4-BE49-F238E27FC236}">
-                  <a16:creationId xmlns:a16="http://schemas.microsoft.com/office/drawing/2014/main" id="{7396FC2C-9723-4879-B11F-311CBDB856B0}"/>
+                  <a16:creationId xmlns:a16="http://schemas.microsoft.com/office/drawing/2014/main" id="{55896B2E-D01B-4F29-B9BA-FBF6407377C2}"/>
                 </a:ext>
               </a:extLst>
             </p:cNvPr>
-            <p:cNvSpPr txBox="1"/>
+            <p:cNvSpPr/>
             <p:nvPr/>
           </p:nvSpPr>
           <p:spPr>
             <a:xfrm>
-              <a:off x="8423262" y="3555609"/>
-              <a:ext cx="833883" cy="461665"/>
+              <a:off x="3585144" y="1935836"/>
+              <a:ext cx="5282120" cy="2971727"/>
             </a:xfrm>
             <a:prstGeom prst="rect">
               <a:avLst/>
             </a:prstGeom>
             <a:noFill/>
+            <a:ln w="57150">
+              <a:solidFill>
+                <a:srgbClr val="89C7DB"/>
+              </a:solidFill>
+            </a:ln>
           </p:spPr>
+          <p:style>
+            <a:lnRef idx="2">
+              <a:schemeClr val="accent1">
+                <a:shade val="50000"/>
+              </a:schemeClr>
+            </a:lnRef>
+            <a:fillRef idx="1">
+              <a:schemeClr val="accent1"/>
+            </a:fillRef>
+            <a:effectRef idx="0">
+              <a:schemeClr val="accent1"/>
+            </a:effectRef>
+            <a:fontRef idx="minor">
+              <a:schemeClr val="lt1"/>
+            </a:fontRef>
+          </p:style>
           <p:txBody>
-            <a:bodyPr wrap="none" rtlCol="0">
-              <a:spAutoFit/>
-            </a:bodyPr>
+            <a:bodyPr rtlCol="0" anchor="ctr"/>
             <a:lstStyle/>
             <a:p>
-              <a:r>
-                <a:rPr lang="pt-BR" sz="2400" b="1" dirty="0">
-                  <a:latin typeface="Bahnschrift" panose="020B0502040204020203" pitchFamily="34" charset="0"/>
-                </a:rPr>
-                <a:t>AWS</a:t>
-              </a:r>
-              <a:endParaRPr lang="pt-BR" b="1" dirty="0">
-                <a:latin typeface="Bahnschrift" panose="020B0502040204020203" pitchFamily="34" charset="0"/>
-              </a:endParaRPr>
+              <a:pPr algn="ctr"/>
+              <a:endParaRPr lang="pt-BR"/>
             </a:p>
           </p:txBody>
         </p:sp>
-        <p:grpSp>
-          <p:nvGrpSpPr>
-            <p:cNvPr id="37" name="Agrupar 36">
+        <p:pic>
+          <p:nvPicPr>
+            <p:cNvPr id="77" name="Imagem 76" descr="Ícone&#10;&#10;Descrição gerada automaticamente">
               <a:extLst>
                 <a:ext uri="{FF2B5EF4-FFF2-40B4-BE49-F238E27FC236}">
-                  <a16:creationId xmlns:a16="http://schemas.microsoft.com/office/drawing/2014/main" id="{53E13F24-4D18-4EDB-BB08-1BC112D8676E}"/>
+                  <a16:creationId xmlns:a16="http://schemas.microsoft.com/office/drawing/2014/main" id="{513A8658-9636-4AC2-86B0-CEA23EF34255}"/>
                 </a:ext>
               </a:extLst>
             </p:cNvPr>
-            <p:cNvGrpSpPr/>
+            <p:cNvPicPr>
+              <a:picLocks noChangeAspect="1"/>
+            </p:cNvPicPr>
             <p:nvPr/>
-          </p:nvGrpSpPr>
-          <p:grpSpPr>
+          </p:nvPicPr>
+          <p:blipFill>
+            <a:blip r:embed="rId4">
+              <a:extLst>
+                <a:ext uri="{28A0092B-C50C-407E-A947-70E740481C1C}">
+                  <a14:useLocalDpi xmlns:a14="http://schemas.microsoft.com/office/drawing/2010/main" val="0"/>
+                </a:ext>
+              </a:extLst>
+            </a:blip>
+            <a:stretch>
+              <a:fillRect/>
+            </a:stretch>
+          </p:blipFill>
+          <p:spPr>
             <a:xfrm>
-              <a:off x="8028187" y="4061509"/>
-              <a:ext cx="2519214" cy="1955398"/>
-              <a:chOff x="8723681" y="4143446"/>
-              <a:chExt cx="1981991" cy="1459351"/>
+              <a:off x="2881250" y="1596483"/>
+              <a:ext cx="1407789" cy="1341568"/>
             </a:xfrm>
-          </p:grpSpPr>
-          <p:pic>
-            <p:nvPicPr>
-              <p:cNvPr id="15" name="Imagem 14" descr="Ícone&#10;&#10;Descrição gerada automaticamente">
-                <a:extLst>
-                  <a:ext uri="{FF2B5EF4-FFF2-40B4-BE49-F238E27FC236}">
-                    <a16:creationId xmlns:a16="http://schemas.microsoft.com/office/drawing/2014/main" id="{C8C761CE-68CE-4786-90E7-FD9C317A7255}"/>
-                  </a:ext>
-                </a:extLst>
-              </p:cNvPr>
-              <p:cNvPicPr>
-                <a:picLocks noChangeAspect="1"/>
-              </p:cNvPicPr>
-              <p:nvPr/>
-            </p:nvPicPr>
-            <p:blipFill>
-              <a:blip r:embed="rId4">
-                <a:extLst>
-                  <a:ext uri="{28A0092B-C50C-407E-A947-70E740481C1C}">
-                    <a14:useLocalDpi xmlns:a14="http://schemas.microsoft.com/office/drawing/2010/main" val="0"/>
-                  </a:ext>
-                </a:extLst>
-              </a:blip>
-              <a:stretch>
-                <a:fillRect/>
-              </a:stretch>
-            </p:blipFill>
-            <p:spPr>
-              <a:xfrm>
-                <a:off x="8723681" y="4143446"/>
-                <a:ext cx="1981991" cy="1459351"/>
-              </a:xfrm>
-              <a:prstGeom prst="rect">
-                <a:avLst/>
-              </a:prstGeom>
-            </p:spPr>
-          </p:pic>
-          <p:sp>
-            <p:nvSpPr>
-              <p:cNvPr id="18" name="CaixaDeTexto 17">
-                <a:extLst>
-                  <a:ext uri="{FF2B5EF4-FFF2-40B4-BE49-F238E27FC236}">
-                    <a16:creationId xmlns:a16="http://schemas.microsoft.com/office/drawing/2014/main" id="{AB1E40B9-0A05-4F08-925C-2DFCB511B288}"/>
-                  </a:ext>
-                </a:extLst>
-              </p:cNvPr>
-              <p:cNvSpPr txBox="1"/>
-              <p:nvPr/>
-            </p:nvSpPr>
-            <p:spPr>
-              <a:xfrm>
-                <a:off x="9264404" y="4447082"/>
-                <a:ext cx="500458" cy="369332"/>
-              </a:xfrm>
-              <a:prstGeom prst="rect">
-                <a:avLst/>
-              </a:prstGeom>
-              <a:noFill/>
-            </p:spPr>
-            <p:txBody>
-              <a:bodyPr wrap="none" rtlCol="0">
-                <a:spAutoFit/>
-              </a:bodyPr>
-              <a:lstStyle/>
-              <a:p>
-                <a:r>
-                  <a:rPr lang="pt-BR" dirty="0">
-                    <a:latin typeface="Bahnschrift" panose="020B0502040204020203" pitchFamily="34" charset="0"/>
-                  </a:rPr>
-                  <a:t>VM</a:t>
-                </a:r>
-              </a:p>
-            </p:txBody>
-          </p:sp>
-        </p:grpSp>
+            <a:prstGeom prst="rect">
+              <a:avLst/>
+            </a:prstGeom>
+          </p:spPr>
+        </p:pic>
+        <p:sp>
+          <p:nvSpPr>
+            <p:cNvPr id="78" name="Retângulo 77">
+              <a:extLst>
+                <a:ext uri="{FF2B5EF4-FFF2-40B4-BE49-F238E27FC236}">
+                  <a16:creationId xmlns:a16="http://schemas.microsoft.com/office/drawing/2014/main" id="{5B9EC99E-C017-4C03-A49A-77FBB3FBD3A2}"/>
+                </a:ext>
+              </a:extLst>
+            </p:cNvPr>
+            <p:cNvSpPr/>
+            <p:nvPr/>
+          </p:nvSpPr>
+          <p:spPr>
+            <a:xfrm>
+              <a:off x="6593367" y="2171376"/>
+              <a:ext cx="1700399" cy="2553887"/>
+            </a:xfrm>
+            <a:prstGeom prst="rect">
+              <a:avLst/>
+            </a:prstGeom>
+            <a:noFill/>
+            <a:ln w="38100">
+              <a:solidFill>
+                <a:srgbClr val="89C7DB"/>
+              </a:solidFill>
+            </a:ln>
+          </p:spPr>
+          <p:style>
+            <a:lnRef idx="2">
+              <a:schemeClr val="accent1">
+                <a:shade val="50000"/>
+              </a:schemeClr>
+            </a:lnRef>
+            <a:fillRef idx="1">
+              <a:schemeClr val="accent1"/>
+            </a:fillRef>
+            <a:effectRef idx="0">
+              <a:schemeClr val="accent1"/>
+            </a:effectRef>
+            <a:fontRef idx="minor">
+              <a:schemeClr val="lt1"/>
+            </a:fontRef>
+          </p:style>
+          <p:txBody>
+            <a:bodyPr rtlCol="0" anchor="ctr"/>
+            <a:lstStyle/>
+            <a:p>
+              <a:pPr algn="ctr"/>
+              <a:endParaRPr lang="pt-BR"/>
+            </a:p>
+          </p:txBody>
+        </p:sp>
+        <p:pic>
+          <p:nvPicPr>
+            <p:cNvPr id="79" name="Imagem 78" descr="Ícone&#10;&#10;Descrição gerada automaticamente">
+              <a:extLst>
+                <a:ext uri="{FF2B5EF4-FFF2-40B4-BE49-F238E27FC236}">
+                  <a16:creationId xmlns:a16="http://schemas.microsoft.com/office/drawing/2014/main" id="{075C8157-9402-430C-BDCE-D3906189803C}"/>
+                </a:ext>
+              </a:extLst>
+            </p:cNvPr>
+            <p:cNvPicPr>
+              <a:picLocks noChangeAspect="1"/>
+            </p:cNvPicPr>
+            <p:nvPr/>
+          </p:nvPicPr>
+          <p:blipFill>
+            <a:blip r:embed="rId5">
+              <a:extLst>
+                <a:ext uri="{28A0092B-C50C-407E-A947-70E740481C1C}">
+                  <a14:useLocalDpi xmlns:a14="http://schemas.microsoft.com/office/drawing/2010/main" val="0"/>
+                </a:ext>
+              </a:extLst>
+            </a:blip>
+            <a:stretch>
+              <a:fillRect/>
+            </a:stretch>
+          </p:blipFill>
+          <p:spPr>
+            <a:xfrm>
+              <a:off x="7855457" y="1914710"/>
+              <a:ext cx="876618" cy="835383"/>
+            </a:xfrm>
+            <a:prstGeom prst="rect">
+              <a:avLst/>
+            </a:prstGeom>
+          </p:spPr>
+        </p:pic>
+        <p:pic>
+          <p:nvPicPr>
+            <p:cNvPr id="80" name="Imagem 79" descr="Forma&#10;&#10;Descrição gerada automaticamente com confiança baixa">
+              <a:extLst>
+                <a:ext uri="{FF2B5EF4-FFF2-40B4-BE49-F238E27FC236}">
+                  <a16:creationId xmlns:a16="http://schemas.microsoft.com/office/drawing/2014/main" id="{D06DD752-326C-447C-9A28-144BB4CD48AC}"/>
+                </a:ext>
+              </a:extLst>
+            </p:cNvPr>
+            <p:cNvPicPr>
+              <a:picLocks noChangeAspect="1"/>
+            </p:cNvPicPr>
+            <p:nvPr/>
+          </p:nvPicPr>
+          <p:blipFill>
+            <a:blip r:embed="rId6">
+              <a:extLst>
+                <a:ext uri="{28A0092B-C50C-407E-A947-70E740481C1C}">
+                  <a14:useLocalDpi xmlns:a14="http://schemas.microsoft.com/office/drawing/2010/main" val="0"/>
+                </a:ext>
+              </a:extLst>
+            </a:blip>
+            <a:stretch>
+              <a:fillRect/>
+            </a:stretch>
+          </p:blipFill>
+          <p:spPr>
+            <a:xfrm>
+              <a:off x="5183110" y="2202021"/>
+              <a:ext cx="1150251" cy="1096144"/>
+            </a:xfrm>
+            <a:prstGeom prst="rect">
+              <a:avLst/>
+            </a:prstGeom>
+          </p:spPr>
+        </p:pic>
+        <p:pic>
+          <p:nvPicPr>
+            <p:cNvPr id="81" name="Imagem 80" descr="Forma&#10;&#10;Descrição gerada automaticamente com confiança baixa">
+              <a:extLst>
+                <a:ext uri="{FF2B5EF4-FFF2-40B4-BE49-F238E27FC236}">
+                  <a16:creationId xmlns:a16="http://schemas.microsoft.com/office/drawing/2014/main" id="{C5BE1721-3947-479B-A1CE-F440FDC03AA7}"/>
+                </a:ext>
+              </a:extLst>
+            </p:cNvPr>
+            <p:cNvPicPr>
+              <a:picLocks noChangeAspect="1"/>
+            </p:cNvPicPr>
+            <p:nvPr/>
+          </p:nvPicPr>
+          <p:blipFill>
+            <a:blip r:embed="rId7">
+              <a:extLst>
+                <a:ext uri="{28A0092B-C50C-407E-A947-70E740481C1C}">
+                  <a14:useLocalDpi xmlns:a14="http://schemas.microsoft.com/office/drawing/2010/main" val="0"/>
+                </a:ext>
+              </a:extLst>
+            </a:blip>
+            <a:stretch>
+              <a:fillRect/>
+            </a:stretch>
+          </p:blipFill>
+          <p:spPr>
+            <a:xfrm>
+              <a:off x="3891016" y="3596284"/>
+              <a:ext cx="989708" cy="943153"/>
+            </a:xfrm>
+            <a:prstGeom prst="rect">
+              <a:avLst/>
+            </a:prstGeom>
+          </p:spPr>
+        </p:pic>
+        <p:pic>
+          <p:nvPicPr>
+            <p:cNvPr id="82" name="Imagem 81" descr="Logotipo&#10;&#10;Descrição gerada automaticamente">
+              <a:extLst>
+                <a:ext uri="{FF2B5EF4-FFF2-40B4-BE49-F238E27FC236}">
+                  <a16:creationId xmlns:a16="http://schemas.microsoft.com/office/drawing/2014/main" id="{60979878-DE0B-4B7B-B457-BFA27326BBA3}"/>
+                </a:ext>
+              </a:extLst>
+            </p:cNvPr>
+            <p:cNvPicPr>
+              <a:picLocks noChangeAspect="1"/>
+            </p:cNvPicPr>
+            <p:nvPr/>
+          </p:nvPicPr>
+          <p:blipFill>
+            <a:blip r:embed="rId8">
+              <a:extLst>
+                <a:ext uri="{28A0092B-C50C-407E-A947-70E740481C1C}">
+                  <a14:useLocalDpi xmlns:a14="http://schemas.microsoft.com/office/drawing/2010/main" val="0"/>
+                </a:ext>
+              </a:extLst>
+            </a:blip>
+            <a:stretch>
+              <a:fillRect/>
+            </a:stretch>
+          </p:blipFill>
+          <p:spPr>
+            <a:xfrm>
+              <a:off x="7037255" y="2996768"/>
+              <a:ext cx="947678" cy="903100"/>
+            </a:xfrm>
+            <a:prstGeom prst="rect">
+              <a:avLst/>
+            </a:prstGeom>
+          </p:spPr>
+        </p:pic>
       </p:grpSp>
       <p:grpSp>
         <p:nvGrpSpPr>
@@ -3965,7 +4205,7 @@
         </p:nvGrpSpPr>
         <p:grpSpPr>
           <a:xfrm>
-            <a:off x="790106" y="3786441"/>
+            <a:off x="790105" y="3786441"/>
             <a:ext cx="4590809" cy="2895186"/>
             <a:chOff x="821748" y="3429000"/>
             <a:chExt cx="4590809" cy="2895186"/>
@@ -4079,7 +4319,7 @@
               <p:nvPr/>
             </p:nvPicPr>
             <p:blipFill>
-              <a:blip r:embed="rId5">
+              <a:blip r:embed="rId8">
                 <a:extLst>
                   <a:ext uri="{28A0092B-C50C-407E-A947-70E740481C1C}">
                     <a14:useLocalDpi xmlns:a14="http://schemas.microsoft.com/office/drawing/2010/main" val="0"/>
@@ -4173,7 +4413,7 @@
               <p:nvPr/>
             </p:nvPicPr>
             <p:blipFill rotWithShape="1">
-              <a:blip r:embed="rId6">
+              <a:blip r:embed="rId9">
                 <a:extLst>
                   <a:ext uri="{28A0092B-C50C-407E-A947-70E740481C1C}">
                     <a14:useLocalDpi xmlns:a14="http://schemas.microsoft.com/office/drawing/2010/main" val="0"/>
@@ -4208,7 +4448,7 @@
               <p:nvPr/>
             </p:nvPicPr>
             <p:blipFill rotWithShape="1">
-              <a:blip r:embed="rId7">
+              <a:blip r:embed="rId10">
                 <a:extLst>
                   <a:ext uri="{28A0092B-C50C-407E-A947-70E740481C1C}">
                     <a14:useLocalDpi xmlns:a14="http://schemas.microsoft.com/office/drawing/2010/main" val="0"/>
@@ -4243,7 +4483,7 @@
               <p:nvPr/>
             </p:nvPicPr>
             <p:blipFill rotWithShape="1">
-              <a:blip r:embed="rId8">
+              <a:blip r:embed="rId11">
                 <a:extLst>
                   <a:ext uri="{28A0092B-C50C-407E-A947-70E740481C1C}">
                     <a14:useLocalDpi xmlns:a14="http://schemas.microsoft.com/office/drawing/2010/main" val="0"/>
@@ -4279,7 +4519,7 @@
             <p:nvPr/>
           </p:nvPicPr>
           <p:blipFill>
-            <a:blip r:embed="rId9">
+            <a:blip r:embed="rId12">
               <a:extLst>
                 <a:ext uri="{28A0092B-C50C-407E-A947-70E740481C1C}">
                   <a14:useLocalDpi xmlns:a14="http://schemas.microsoft.com/office/drawing/2010/main" val="0"/>
@@ -4535,7 +4775,7 @@
           <p:nvPr/>
         </p:nvPicPr>
         <p:blipFill>
-          <a:blip r:embed="rId10">
+          <a:blip r:embed="rId13">
             <a:extLst>
               <a:ext uri="{28A0092B-C50C-407E-A947-70E740481C1C}">
                 <a14:useLocalDpi xmlns:a14="http://schemas.microsoft.com/office/drawing/2010/main" val="0"/>
@@ -4852,11 +5092,11 @@
             <p:nvPr/>
           </p:nvPicPr>
           <p:blipFill rotWithShape="1">
-            <a:blip r:embed="rId11">
+            <a:blip r:embed="rId14">
               <a:extLst>
                 <a:ext uri="{BEBA8EAE-BF5A-486C-A8C5-ECC9F3942E4B}">
                   <a14:imgProps xmlns:a14="http://schemas.microsoft.com/office/drawing/2010/main">
-                    <a14:imgLayer r:embed="rId12">
+                    <a14:imgLayer r:embed="rId15">
                       <a14:imgEffect>
                         <a14:backgroundRemoval t="9906" b="89623" l="28824" r="72713">
                           <a14:foregroundMark x1="28901" y1="28774" x2="28824" y2="42453"/>
@@ -4905,7 +5145,7 @@
             <p:nvPr/>
           </p:nvPicPr>
           <p:blipFill>
-            <a:blip r:embed="rId13">
+            <a:blip r:embed="rId16">
               <a:extLst>
                 <a:ext uri="{28A0092B-C50C-407E-A947-70E740481C1C}">
                   <a14:useLocalDpi xmlns:a14="http://schemas.microsoft.com/office/drawing/2010/main" val="0"/>
@@ -4927,116 +5167,6 @@
           </p:spPr>
         </p:pic>
       </p:grpSp>
-      <p:grpSp>
-        <p:nvGrpSpPr>
-          <p:cNvPr id="57" name="Agrupar 56">
-            <a:extLst>
-              <a:ext uri="{FF2B5EF4-FFF2-40B4-BE49-F238E27FC236}">
-                <a16:creationId xmlns:a16="http://schemas.microsoft.com/office/drawing/2014/main" id="{5CED29F4-C225-47E8-971F-B81A391D176F}"/>
-              </a:ext>
-            </a:extLst>
-          </p:cNvPr>
-          <p:cNvGrpSpPr/>
-          <p:nvPr/>
-        </p:nvGrpSpPr>
-        <p:grpSpPr>
-          <a:xfrm>
-            <a:off x="9231184" y="4666079"/>
-            <a:ext cx="990990" cy="944500"/>
-            <a:chOff x="9297429" y="696095"/>
-            <a:chExt cx="1892674" cy="1642690"/>
-          </a:xfrm>
-        </p:grpSpPr>
-        <p:pic>
-          <p:nvPicPr>
-            <p:cNvPr id="58" name="Imagem 57" descr="Interface gráfica do usuário, Texto&#10;&#10;Descrição gerada automaticamente com confiança média">
-              <a:extLst>
-                <a:ext uri="{FF2B5EF4-FFF2-40B4-BE49-F238E27FC236}">
-                  <a16:creationId xmlns:a16="http://schemas.microsoft.com/office/drawing/2014/main" id="{70217172-2CCB-4EBC-89EE-948B4AF99DE2}"/>
-                </a:ext>
-              </a:extLst>
-            </p:cNvPr>
-            <p:cNvPicPr>
-              <a:picLocks noChangeAspect="1"/>
-            </p:cNvPicPr>
-            <p:nvPr/>
-          </p:nvPicPr>
-          <p:blipFill rotWithShape="1">
-            <a:blip r:embed="rId11">
-              <a:extLst>
-                <a:ext uri="{BEBA8EAE-BF5A-486C-A8C5-ECC9F3942E4B}">
-                  <a14:imgProps xmlns:a14="http://schemas.microsoft.com/office/drawing/2010/main">
-                    <a14:imgLayer r:embed="rId12">
-                      <a14:imgEffect>
-                        <a14:backgroundRemoval t="9906" b="89623" l="28824" r="72713">
-                          <a14:foregroundMark x1="28901" y1="28774" x2="28824" y2="42453"/>
-                          <a14:foregroundMark x1="35819" y1="36792" x2="34666" y2="43868"/>
-                          <a14:foregroundMark x1="41276" y1="38679" x2="42429" y2="36321"/>
-                          <a14:foregroundMark x1="46733" y1="41981" x2="47502" y2="37264"/>
-                          <a14:foregroundMark x1="51268" y1="39151" x2="52267" y2="36792"/>
-                          <a14:foregroundMark x1="70561" y1="29245" x2="70945" y2="38208"/>
-                          <a14:foregroundMark x1="72560" y1="34906" x2="72713" y2="40566"/>
-                          <a14:foregroundMark x1="60492" y1="47642" x2="60492" y2="42925"/>
-                        </a14:backgroundRemoval>
-                      </a14:imgEffect>
-                    </a14:imgLayer>
-                  </a14:imgProps>
-                </a:ext>
-                <a:ext uri="{28A0092B-C50C-407E-A947-70E740481C1C}">
-                  <a14:useLocalDpi xmlns:a14="http://schemas.microsoft.com/office/drawing/2010/main" val="0"/>
-                </a:ext>
-              </a:extLst>
-            </a:blip>
-            <a:srcRect l="25186" r="23974"/>
-            <a:stretch/>
-          </p:blipFill>
-          <p:spPr>
-            <a:xfrm>
-              <a:off x="9297429" y="1732150"/>
-              <a:ext cx="1892674" cy="606635"/>
-            </a:xfrm>
-            <a:prstGeom prst="rect">
-              <a:avLst/>
-            </a:prstGeom>
-          </p:spPr>
-        </p:pic>
-        <p:pic>
-          <p:nvPicPr>
-            <p:cNvPr id="59" name="Imagem 58" descr="Logotipo&#10;&#10;Descrição gerada automaticamente">
-              <a:extLst>
-                <a:ext uri="{FF2B5EF4-FFF2-40B4-BE49-F238E27FC236}">
-                  <a16:creationId xmlns:a16="http://schemas.microsoft.com/office/drawing/2014/main" id="{2C9850A7-615E-49B6-97DB-5A2C11FEF3C9}"/>
-                </a:ext>
-              </a:extLst>
-            </p:cNvPr>
-            <p:cNvPicPr>
-              <a:picLocks noChangeAspect="1"/>
-            </p:cNvPicPr>
-            <p:nvPr/>
-          </p:nvPicPr>
-          <p:blipFill>
-            <a:blip r:embed="rId13">
-              <a:extLst>
-                <a:ext uri="{28A0092B-C50C-407E-A947-70E740481C1C}">
-                  <a14:useLocalDpi xmlns:a14="http://schemas.microsoft.com/office/drawing/2010/main" val="0"/>
-                </a:ext>
-              </a:extLst>
-            </a:blip>
-            <a:stretch>
-              <a:fillRect/>
-            </a:stretch>
-          </p:blipFill>
-          <p:spPr>
-            <a:xfrm>
-              <a:off x="9658194" y="696095"/>
-              <a:ext cx="1162205" cy="1162205"/>
-            </a:xfrm>
-            <a:prstGeom prst="rect">
-              <a:avLst/>
-            </a:prstGeom>
-          </p:spPr>
-        </p:pic>
-      </p:grpSp>
       <p:cxnSp>
         <p:nvCxnSpPr>
           <p:cNvPr id="64" name="Conector de Seta Reta 63">
@@ -5053,8 +5183,8 @@
         </p:nvCxnSpPr>
         <p:spPr>
           <a:xfrm>
-            <a:off x="9420078" y="3238004"/>
-            <a:ext cx="0" cy="765671"/>
+            <a:off x="10002092" y="3233342"/>
+            <a:ext cx="0" cy="871298"/>
           </a:xfrm>
           <a:prstGeom prst="straightConnector1">
             <a:avLst/>
@@ -5131,7 +5261,7 @@
           <p:nvPr/>
         </p:nvPicPr>
         <p:blipFill>
-          <a:blip r:embed="rId14">
+          <a:blip r:embed="rId17">
             <a:extLst>
               <a:ext uri="{28A0092B-C50C-407E-A947-70E740481C1C}">
                 <a14:useLocalDpi xmlns:a14="http://schemas.microsoft.com/office/drawing/2010/main" val="0"/>
@@ -5167,7 +5297,7 @@
           <p:nvPr/>
         </p:nvPicPr>
         <p:blipFill>
-          <a:blip r:embed="rId15">
+          <a:blip r:embed="rId18">
             <a:extLst>
               <a:ext uri="{28A0092B-C50C-407E-A947-70E740481C1C}">
                 <a14:useLocalDpi xmlns:a14="http://schemas.microsoft.com/office/drawing/2010/main" val="0"/>
@@ -5203,7 +5333,7 @@
         <p:spPr>
           <a:xfrm>
             <a:off x="7813858" y="808969"/>
-            <a:ext cx="506870" cy="369332"/>
+            <a:ext cx="428322" cy="369332"/>
           </a:xfrm>
           <a:prstGeom prst="rect">
             <a:avLst/>
@@ -5220,7 +5350,7 @@
               <a:rPr lang="pt-BR" dirty="0">
                 <a:latin typeface="Bahnschrift" panose="020B0502040204020203" pitchFamily="34" charset="0"/>
               </a:rPr>
-              <a:t>x10</a:t>
+              <a:t>x5</a:t>
             </a:r>
           </a:p>
         </p:txBody>
@@ -5331,7 +5461,7 @@
           <p:nvPr/>
         </p:nvPicPr>
         <p:blipFill>
-          <a:blip r:embed="rId16">
+          <a:blip r:embed="rId19">
             <a:extLst>
               <a:ext uri="{28A0092B-C50C-407E-A947-70E740481C1C}">
                 <a14:useLocalDpi xmlns:a14="http://schemas.microsoft.com/office/drawing/2010/main" val="0"/>
@@ -5367,7 +5497,7 @@
           <p:nvPr/>
         </p:nvPicPr>
         <p:blipFill>
-          <a:blip r:embed="rId17">
+          <a:blip r:embed="rId20">
             <a:extLst>
               <a:ext uri="{28A0092B-C50C-407E-A947-70E740481C1C}">
                 <a14:useLocalDpi xmlns:a14="http://schemas.microsoft.com/office/drawing/2010/main" val="0"/>
@@ -5403,7 +5533,7 @@
           <p:nvPr/>
         </p:nvPicPr>
         <p:blipFill>
-          <a:blip r:embed="rId18">
+          <a:blip r:embed="rId21">
             <a:extLst>
               <a:ext uri="{28A0092B-C50C-407E-A947-70E740481C1C}">
                 <a14:useLocalDpi xmlns:a14="http://schemas.microsoft.com/office/drawing/2010/main" val="0"/>
@@ -5438,7 +5568,7 @@
         </p:nvSpPr>
         <p:spPr>
           <a:xfrm>
-            <a:off x="4195210" y="704139"/>
+            <a:off x="4197280" y="704139"/>
             <a:ext cx="1061868" cy="1866397"/>
           </a:xfrm>
           <a:prstGeom prst="roundRect">
@@ -5638,7 +5768,7 @@
           <p:nvPr/>
         </p:nvPicPr>
         <p:blipFill>
-          <a:blip r:embed="rId19">
+          <a:blip r:embed="rId22">
             <a:extLst>
               <a:ext uri="{28A0092B-C50C-407E-A947-70E740481C1C}">
                 <a14:useLocalDpi xmlns:a14="http://schemas.microsoft.com/office/drawing/2010/main" val="0"/>
@@ -5719,8 +5849,8 @@
         </p:nvCxnSpPr>
         <p:spPr>
           <a:xfrm flipH="1">
-            <a:off x="5347449" y="5535266"/>
-            <a:ext cx="1519151" cy="0"/>
+            <a:off x="5347450" y="5535266"/>
+            <a:ext cx="1167881" cy="0"/>
           </a:xfrm>
           <a:prstGeom prst="straightConnector1">
             <a:avLst/>
@@ -5749,10 +5879,10 @@
       </p:cxnSp>
       <p:pic>
         <p:nvPicPr>
-          <p:cNvPr id="118" name="Imagem 117" descr="Forma&#10;&#10;Descrição gerada automaticamente com confiança baixa">
-            <a:extLst>
-              <a:ext uri="{FF2B5EF4-FFF2-40B4-BE49-F238E27FC236}">
-                <a16:creationId xmlns:a16="http://schemas.microsoft.com/office/drawing/2014/main" id="{583F1197-115D-4BFD-9E22-9F206CC8612A}"/>
+          <p:cNvPr id="119" name="Imagem 118" descr="Forma&#10;&#10;Descrição gerada automaticamente com confiança baixa">
+            <a:extLst>
+              <a:ext uri="{FF2B5EF4-FFF2-40B4-BE49-F238E27FC236}">
+                <a16:creationId xmlns:a16="http://schemas.microsoft.com/office/drawing/2014/main" id="{C076618E-A85D-4B2A-AD2F-2D20B00633CE}"/>
               </a:ext>
             </a:extLst>
           </p:cNvPr>
@@ -5762,43 +5892,7 @@
           <p:nvPr/>
         </p:nvPicPr>
         <p:blipFill>
-          <a:blip r:embed="rId9">
-            <a:extLst>
-              <a:ext uri="{28A0092B-C50C-407E-A947-70E740481C1C}">
-                <a14:useLocalDpi xmlns:a14="http://schemas.microsoft.com/office/drawing/2010/main" val="0"/>
-              </a:ext>
-            </a:extLst>
-          </a:blip>
-          <a:stretch>
-            <a:fillRect/>
-          </a:stretch>
-        </p:blipFill>
-        <p:spPr>
-          <a:xfrm>
-            <a:off x="8784273" y="5169461"/>
-            <a:ext cx="346755" cy="346755"/>
-          </a:xfrm>
-          <a:prstGeom prst="rect">
-            <a:avLst/>
-          </a:prstGeom>
-        </p:spPr>
-      </p:pic>
-      <p:pic>
-        <p:nvPicPr>
-          <p:cNvPr id="119" name="Imagem 118" descr="Forma&#10;&#10;Descrição gerada automaticamente com confiança baixa">
-            <a:extLst>
-              <a:ext uri="{FF2B5EF4-FFF2-40B4-BE49-F238E27FC236}">
-                <a16:creationId xmlns:a16="http://schemas.microsoft.com/office/drawing/2014/main" id="{C076618E-A85D-4B2A-AD2F-2D20B00633CE}"/>
-              </a:ext>
-            </a:extLst>
-          </p:cNvPr>
-          <p:cNvPicPr>
-            <a:picLocks noChangeAspect="1"/>
-          </p:cNvPicPr>
-          <p:nvPr/>
-        </p:nvPicPr>
-        <p:blipFill>
-          <a:blip r:embed="rId9">
+          <a:blip r:embed="rId12">
             <a:extLst>
               <a:ext uri="{28A0092B-C50C-407E-A947-70E740481C1C}">
                 <a14:useLocalDpi xmlns:a14="http://schemas.microsoft.com/office/drawing/2010/main" val="0"/>
@@ -5878,7 +5972,7 @@
           <p:nvPr/>
         </p:nvPicPr>
         <p:blipFill>
-          <a:blip r:embed="rId20">
+          <a:blip r:embed="rId23">
             <a:extLst>
               <a:ext uri="{28A0092B-C50C-407E-A947-70E740481C1C}">
                 <a14:useLocalDpi xmlns:a14="http://schemas.microsoft.com/office/drawing/2010/main" val="0"/>
@@ -5899,118 +5993,478 @@
           </a:prstGeom>
         </p:spPr>
       </p:pic>
-      <p:pic>
-        <p:nvPicPr>
-          <p:cNvPr id="126" name="Imagem 125" descr="Uma imagem contendo Ícone&#10;&#10;Descrição gerada automaticamente">
-            <a:extLst>
-              <a:ext uri="{FF2B5EF4-FFF2-40B4-BE49-F238E27FC236}">
-                <a16:creationId xmlns:a16="http://schemas.microsoft.com/office/drawing/2014/main" id="{BDFB193B-3F50-4D10-9854-445C3A6D846B}"/>
-              </a:ext>
-            </a:extLst>
-          </p:cNvPr>
-          <p:cNvPicPr>
-            <a:picLocks noChangeAspect="1"/>
-          </p:cNvPicPr>
+      <p:sp>
+        <p:nvSpPr>
+          <p:cNvPr id="69" name="CaixaDeTexto 68">
+            <a:extLst>
+              <a:ext uri="{FF2B5EF4-FFF2-40B4-BE49-F238E27FC236}">
+                <a16:creationId xmlns:a16="http://schemas.microsoft.com/office/drawing/2014/main" id="{2728E462-89EB-4DF4-99BA-8ED882501CEA}"/>
+              </a:ext>
+            </a:extLst>
+          </p:cNvPr>
+          <p:cNvSpPr txBox="1"/>
           <p:nvPr/>
-        </p:nvPicPr>
-        <p:blipFill>
-          <a:blip r:embed="rId15">
-            <a:extLst>
-              <a:ext uri="{28A0092B-C50C-407E-A947-70E740481C1C}">
-                <a14:useLocalDpi xmlns:a14="http://schemas.microsoft.com/office/drawing/2010/main" val="0"/>
-              </a:ext>
-            </a:extLst>
-          </a:blip>
-          <a:stretch>
-            <a:fillRect/>
-          </a:stretch>
-        </p:blipFill>
+        </p:nvSpPr>
         <p:spPr>
           <a:xfrm>
-            <a:off x="7065794" y="5411529"/>
-            <a:ext cx="544623" cy="363990"/>
+            <a:off x="8524588" y="4011921"/>
+            <a:ext cx="833883" cy="461665"/>
           </a:xfrm>
           <a:prstGeom prst="rect">
             <a:avLst/>
           </a:prstGeom>
+          <a:noFill/>
         </p:spPr>
-      </p:pic>
-      <p:pic>
-        <p:nvPicPr>
-          <p:cNvPr id="127" name="Imagem 126" descr="Uma imagem contendo Texto&#10;&#10;Descrição gerada automaticamente">
-            <a:extLst>
-              <a:ext uri="{FF2B5EF4-FFF2-40B4-BE49-F238E27FC236}">
-                <a16:creationId xmlns:a16="http://schemas.microsoft.com/office/drawing/2014/main" id="{F91FE1B5-41A6-47DC-A7DA-98FECB51208F}"/>
-              </a:ext>
-            </a:extLst>
-          </p:cNvPr>
-          <p:cNvPicPr>
-            <a:picLocks noChangeAspect="1"/>
-          </p:cNvPicPr>
+        <p:txBody>
+          <a:bodyPr wrap="none" rtlCol="0">
+            <a:spAutoFit/>
+          </a:bodyPr>
+          <a:lstStyle/>
+          <a:p>
+            <a:r>
+              <a:rPr lang="pt-BR" sz="2400" b="1" dirty="0">
+                <a:latin typeface="Bahnschrift" panose="020B0502040204020203" pitchFamily="34" charset="0"/>
+              </a:rPr>
+              <a:t>AWS</a:t>
+            </a:r>
+            <a:endParaRPr lang="pt-BR" b="1" dirty="0">
+              <a:latin typeface="Bahnschrift" panose="020B0502040204020203" pitchFamily="34" charset="0"/>
+            </a:endParaRPr>
+          </a:p>
+        </p:txBody>
+      </p:sp>
+      <p:sp>
+        <p:nvSpPr>
+          <p:cNvPr id="17" name="CaixaDeTexto 16">
+            <a:extLst>
+              <a:ext uri="{FF2B5EF4-FFF2-40B4-BE49-F238E27FC236}">
+                <a16:creationId xmlns:a16="http://schemas.microsoft.com/office/drawing/2014/main" id="{B7B9BCE1-3D64-4E13-A98F-377773E5F905}"/>
+              </a:ext>
+            </a:extLst>
+          </p:cNvPr>
+          <p:cNvSpPr txBox="1"/>
           <p:nvPr/>
-        </p:nvPicPr>
-        <p:blipFill>
-          <a:blip r:embed="rId16">
-            <a:extLst>
-              <a:ext uri="{28A0092B-C50C-407E-A947-70E740481C1C}">
-                <a14:useLocalDpi xmlns:a14="http://schemas.microsoft.com/office/drawing/2010/main" val="0"/>
-              </a:ext>
-            </a:extLst>
-          </a:blip>
-          <a:stretch>
-            <a:fillRect/>
-          </a:stretch>
-        </p:blipFill>
+        </p:nvSpPr>
         <p:spPr>
           <a:xfrm>
-            <a:off x="7374296" y="4735568"/>
-            <a:ext cx="653245" cy="653245"/>
+            <a:off x="-1477547" y="3406594"/>
+            <a:ext cx="2532288" cy="1200329"/>
           </a:xfrm>
           <a:prstGeom prst="rect">
             <a:avLst/>
           </a:prstGeom>
+          <a:noFill/>
         </p:spPr>
-      </p:pic>
-      <p:pic>
-        <p:nvPicPr>
-          <p:cNvPr id="128" name="Imagem 127" descr="Forma&#10;&#10;Descrição gerada automaticamente com confiança baixa">
-            <a:extLst>
-              <a:ext uri="{FF2B5EF4-FFF2-40B4-BE49-F238E27FC236}">
-                <a16:creationId xmlns:a16="http://schemas.microsoft.com/office/drawing/2014/main" id="{BFFEC462-CCC5-4260-A519-8642F4D63FFD}"/>
-              </a:ext>
-            </a:extLst>
-          </p:cNvPr>
-          <p:cNvPicPr>
-            <a:picLocks noChangeAspect="1"/>
-          </p:cNvPicPr>
-          <p:nvPr/>
-        </p:nvPicPr>
-        <p:blipFill>
-          <a:blip r:embed="rId17">
-            <a:extLst>
-              <a:ext uri="{28A0092B-C50C-407E-A947-70E740481C1C}">
-                <a14:useLocalDpi xmlns:a14="http://schemas.microsoft.com/office/drawing/2010/main" val="0"/>
-              </a:ext>
-            </a:extLst>
-          </a:blip>
-          <a:stretch>
-            <a:fillRect/>
-          </a:stretch>
-        </p:blipFill>
-        <p:spPr>
-          <a:xfrm>
-            <a:off x="7685312" y="5361604"/>
-            <a:ext cx="551733" cy="551733"/>
-          </a:xfrm>
-          <a:prstGeom prst="rect">
-            <a:avLst/>
-          </a:prstGeom>
-        </p:spPr>
-      </p:pic>
+        <p:txBody>
+          <a:bodyPr wrap="square" rtlCol="0">
+            <a:spAutoFit/>
+          </a:bodyPr>
+          <a:lstStyle/>
+          <a:p>
+            <a:r>
+              <a:rPr lang="pt-BR" dirty="0"/>
+              <a:t>Explicar melhor no </a:t>
+            </a:r>
+            <a:r>
+              <a:rPr lang="pt-BR" dirty="0" err="1"/>
+              <a:t>azure</a:t>
+            </a:r>
+            <a:endParaRPr lang="pt-BR" dirty="0"/>
+          </a:p>
+          <a:p>
+            <a:r>
+              <a:rPr lang="pt-BR" dirty="0"/>
+              <a:t>Inverter a nuvem com as áreas</a:t>
+            </a:r>
+          </a:p>
+          <a:p>
+            <a:r>
+              <a:rPr lang="pt-BR" dirty="0"/>
+              <a:t>Nuvem própria do </a:t>
+            </a:r>
+            <a:r>
+              <a:rPr lang="pt-BR" dirty="0" err="1"/>
+              <a:t>slcka</a:t>
+            </a:r>
+            <a:endParaRPr lang="pt-BR" dirty="0"/>
+          </a:p>
+        </p:txBody>
+      </p:sp>
     </p:spTree>
     <p:extLst>
       <p:ext uri="{BB962C8B-B14F-4D97-AF65-F5344CB8AC3E}">
         <p14:creationId xmlns:p14="http://schemas.microsoft.com/office/powerpoint/2010/main" val="4053529955"/>
+      </p:ext>
+    </p:extLst>
+  </p:cSld>
+  <p:clrMapOvr>
+    <a:masterClrMapping/>
+  </p:clrMapOvr>
+</p:sld>
+</file>
+
+<file path=ppt/slides/slide2.xml><?xml version="1.0" encoding="utf-8"?>
+<p:sld xmlns:a="http://schemas.openxmlformats.org/drawingml/2006/main" xmlns:r="http://schemas.openxmlformats.org/officeDocument/2006/relationships" xmlns:p="http://schemas.openxmlformats.org/presentationml/2006/main">
+  <p:cSld>
+    <p:spTree>
+      <p:nvGrpSpPr>
+        <p:cNvPr id="1" name=""/>
+        <p:cNvGrpSpPr/>
+        <p:nvPr/>
+      </p:nvGrpSpPr>
+      <p:grpSpPr>
+        <a:xfrm>
+          <a:off x="0" y="0"/>
+          <a:ext cx="0" cy="0"/>
+          <a:chOff x="0" y="0"/>
+          <a:chExt cx="0" cy="0"/>
+        </a:xfrm>
+      </p:grpSpPr>
+      <p:grpSp>
+        <p:nvGrpSpPr>
+          <p:cNvPr id="27" name="Agrupar 26">
+            <a:extLst>
+              <a:ext uri="{FF2B5EF4-FFF2-40B4-BE49-F238E27FC236}">
+                <a16:creationId xmlns:a16="http://schemas.microsoft.com/office/drawing/2014/main" id="{AFA3271C-F0D6-43E8-B07F-1401D220AF3E}"/>
+              </a:ext>
+            </a:extLst>
+          </p:cNvPr>
+          <p:cNvGrpSpPr/>
+          <p:nvPr/>
+        </p:nvGrpSpPr>
+        <p:grpSpPr>
+          <a:xfrm>
+            <a:off x="744025" y="-35695"/>
+            <a:ext cx="6337495" cy="3464695"/>
+            <a:chOff x="744025" y="-35695"/>
+            <a:chExt cx="10391335" cy="6040255"/>
+          </a:xfrm>
+        </p:grpSpPr>
+        <p:pic>
+          <p:nvPicPr>
+            <p:cNvPr id="5" name="Imagem 4" descr="Ícone&#10;&#10;Descrição gerada automaticamente">
+              <a:extLst>
+                <a:ext uri="{FF2B5EF4-FFF2-40B4-BE49-F238E27FC236}">
+                  <a16:creationId xmlns:a16="http://schemas.microsoft.com/office/drawing/2014/main" id="{5F3264B9-E303-4D39-9E23-3820725F00FB}"/>
+                </a:ext>
+              </a:extLst>
+            </p:cNvPr>
+            <p:cNvPicPr>
+              <a:picLocks noChangeAspect="1"/>
+            </p:cNvPicPr>
+            <p:nvPr/>
+          </p:nvPicPr>
+          <p:blipFill>
+            <a:blip r:embed="rId3">
+              <a:extLst>
+                <a:ext uri="{28A0092B-C50C-407E-A947-70E740481C1C}">
+                  <a14:useLocalDpi xmlns:a14="http://schemas.microsoft.com/office/drawing/2010/main" val="0"/>
+                </a:ext>
+              </a:extLst>
+            </a:blip>
+            <a:stretch>
+              <a:fillRect/>
+            </a:stretch>
+          </p:blipFill>
+          <p:spPr>
+            <a:xfrm>
+              <a:off x="744025" y="-35695"/>
+              <a:ext cx="10391335" cy="6040255"/>
+            </a:xfrm>
+            <a:prstGeom prst="rect">
+              <a:avLst/>
+            </a:prstGeom>
+          </p:spPr>
+        </p:pic>
+        <p:sp>
+          <p:nvSpPr>
+            <p:cNvPr id="13" name="Retângulo 12">
+              <a:extLst>
+                <a:ext uri="{FF2B5EF4-FFF2-40B4-BE49-F238E27FC236}">
+                  <a16:creationId xmlns:a16="http://schemas.microsoft.com/office/drawing/2014/main" id="{8C9192BA-D78A-420A-A65F-772297A18B57}"/>
+                </a:ext>
+              </a:extLst>
+            </p:cNvPr>
+            <p:cNvSpPr/>
+            <p:nvPr/>
+          </p:nvSpPr>
+          <p:spPr>
+            <a:xfrm>
+              <a:off x="3585144" y="1935836"/>
+              <a:ext cx="5282120" cy="2971727"/>
+            </a:xfrm>
+            <a:prstGeom prst="rect">
+              <a:avLst/>
+            </a:prstGeom>
+            <a:noFill/>
+            <a:ln w="57150">
+              <a:solidFill>
+                <a:srgbClr val="89C7DB"/>
+              </a:solidFill>
+            </a:ln>
+          </p:spPr>
+          <p:style>
+            <a:lnRef idx="2">
+              <a:schemeClr val="accent1">
+                <a:shade val="50000"/>
+              </a:schemeClr>
+            </a:lnRef>
+            <a:fillRef idx="1">
+              <a:schemeClr val="accent1"/>
+            </a:fillRef>
+            <a:effectRef idx="0">
+              <a:schemeClr val="accent1"/>
+            </a:effectRef>
+            <a:fontRef idx="minor">
+              <a:schemeClr val="lt1"/>
+            </a:fontRef>
+          </p:style>
+          <p:txBody>
+            <a:bodyPr rtlCol="0" anchor="ctr"/>
+            <a:lstStyle/>
+            <a:p>
+              <a:pPr algn="ctr"/>
+              <a:endParaRPr lang="pt-BR"/>
+            </a:p>
+          </p:txBody>
+        </p:sp>
+        <p:pic>
+          <p:nvPicPr>
+            <p:cNvPr id="14" name="Imagem 13" descr="Ícone&#10;&#10;Descrição gerada automaticamente">
+              <a:extLst>
+                <a:ext uri="{FF2B5EF4-FFF2-40B4-BE49-F238E27FC236}">
+                  <a16:creationId xmlns:a16="http://schemas.microsoft.com/office/drawing/2014/main" id="{1BDF53DF-A31A-4DF4-82FA-A66F763509DE}"/>
+                </a:ext>
+              </a:extLst>
+            </p:cNvPr>
+            <p:cNvPicPr>
+              <a:picLocks noChangeAspect="1"/>
+            </p:cNvPicPr>
+            <p:nvPr/>
+          </p:nvPicPr>
+          <p:blipFill>
+            <a:blip r:embed="rId4">
+              <a:extLst>
+                <a:ext uri="{28A0092B-C50C-407E-A947-70E740481C1C}">
+                  <a14:useLocalDpi xmlns:a14="http://schemas.microsoft.com/office/drawing/2010/main" val="0"/>
+                </a:ext>
+              </a:extLst>
+            </a:blip>
+            <a:stretch>
+              <a:fillRect/>
+            </a:stretch>
+          </p:blipFill>
+          <p:spPr>
+            <a:xfrm>
+              <a:off x="2881250" y="1596483"/>
+              <a:ext cx="1407789" cy="1341568"/>
+            </a:xfrm>
+            <a:prstGeom prst="rect">
+              <a:avLst/>
+            </a:prstGeom>
+          </p:spPr>
+        </p:pic>
+        <p:sp>
+          <p:nvSpPr>
+            <p:cNvPr id="16" name="Retângulo 15">
+              <a:extLst>
+                <a:ext uri="{FF2B5EF4-FFF2-40B4-BE49-F238E27FC236}">
+                  <a16:creationId xmlns:a16="http://schemas.microsoft.com/office/drawing/2014/main" id="{93F716AA-7F49-438C-A76F-F5EB30ECA46B}"/>
+                </a:ext>
+              </a:extLst>
+            </p:cNvPr>
+            <p:cNvSpPr/>
+            <p:nvPr/>
+          </p:nvSpPr>
+          <p:spPr>
+            <a:xfrm>
+              <a:off x="6593367" y="2171376"/>
+              <a:ext cx="1700399" cy="2553887"/>
+            </a:xfrm>
+            <a:prstGeom prst="rect">
+              <a:avLst/>
+            </a:prstGeom>
+            <a:noFill/>
+            <a:ln w="38100">
+              <a:solidFill>
+                <a:srgbClr val="89C7DB"/>
+              </a:solidFill>
+            </a:ln>
+          </p:spPr>
+          <p:style>
+            <a:lnRef idx="2">
+              <a:schemeClr val="accent1">
+                <a:shade val="50000"/>
+              </a:schemeClr>
+            </a:lnRef>
+            <a:fillRef idx="1">
+              <a:schemeClr val="accent1"/>
+            </a:fillRef>
+            <a:effectRef idx="0">
+              <a:schemeClr val="accent1"/>
+            </a:effectRef>
+            <a:fontRef idx="minor">
+              <a:schemeClr val="lt1"/>
+            </a:fontRef>
+          </p:style>
+          <p:txBody>
+            <a:bodyPr rtlCol="0" anchor="ctr"/>
+            <a:lstStyle/>
+            <a:p>
+              <a:pPr algn="ctr"/>
+              <a:endParaRPr lang="pt-BR"/>
+            </a:p>
+          </p:txBody>
+        </p:sp>
+        <p:pic>
+          <p:nvPicPr>
+            <p:cNvPr id="15" name="Imagem 14" descr="Ícone&#10;&#10;Descrição gerada automaticamente">
+              <a:extLst>
+                <a:ext uri="{FF2B5EF4-FFF2-40B4-BE49-F238E27FC236}">
+                  <a16:creationId xmlns:a16="http://schemas.microsoft.com/office/drawing/2014/main" id="{49B21DE7-6D6E-4027-9802-3B7B7D80C37D}"/>
+                </a:ext>
+              </a:extLst>
+            </p:cNvPr>
+            <p:cNvPicPr>
+              <a:picLocks noChangeAspect="1"/>
+            </p:cNvPicPr>
+            <p:nvPr/>
+          </p:nvPicPr>
+          <p:blipFill>
+            <a:blip r:embed="rId5">
+              <a:extLst>
+                <a:ext uri="{28A0092B-C50C-407E-A947-70E740481C1C}">
+                  <a14:useLocalDpi xmlns:a14="http://schemas.microsoft.com/office/drawing/2010/main" val="0"/>
+                </a:ext>
+              </a:extLst>
+            </a:blip>
+            <a:stretch>
+              <a:fillRect/>
+            </a:stretch>
+          </p:blipFill>
+          <p:spPr>
+            <a:xfrm>
+              <a:off x="7855457" y="1914710"/>
+              <a:ext cx="876618" cy="835383"/>
+            </a:xfrm>
+            <a:prstGeom prst="rect">
+              <a:avLst/>
+            </a:prstGeom>
+          </p:spPr>
+        </p:pic>
+        <p:pic>
+          <p:nvPicPr>
+            <p:cNvPr id="18" name="Imagem 17" descr="Forma&#10;&#10;Descrição gerada automaticamente com confiança baixa">
+              <a:extLst>
+                <a:ext uri="{FF2B5EF4-FFF2-40B4-BE49-F238E27FC236}">
+                  <a16:creationId xmlns:a16="http://schemas.microsoft.com/office/drawing/2014/main" id="{629C6AEB-8EFA-49EF-B084-60DF3A10B8C7}"/>
+                </a:ext>
+              </a:extLst>
+            </p:cNvPr>
+            <p:cNvPicPr>
+              <a:picLocks noChangeAspect="1"/>
+            </p:cNvPicPr>
+            <p:nvPr/>
+          </p:nvPicPr>
+          <p:blipFill>
+            <a:blip r:embed="rId6">
+              <a:extLst>
+                <a:ext uri="{28A0092B-C50C-407E-A947-70E740481C1C}">
+                  <a14:useLocalDpi xmlns:a14="http://schemas.microsoft.com/office/drawing/2010/main" val="0"/>
+                </a:ext>
+              </a:extLst>
+            </a:blip>
+            <a:stretch>
+              <a:fillRect/>
+            </a:stretch>
+          </p:blipFill>
+          <p:spPr>
+            <a:xfrm>
+              <a:off x="5183110" y="2202021"/>
+              <a:ext cx="1150251" cy="1096144"/>
+            </a:xfrm>
+            <a:prstGeom prst="rect">
+              <a:avLst/>
+            </a:prstGeom>
+          </p:spPr>
+        </p:pic>
+        <p:pic>
+          <p:nvPicPr>
+            <p:cNvPr id="20" name="Imagem 19" descr="Forma&#10;&#10;Descrição gerada automaticamente com confiança baixa">
+              <a:extLst>
+                <a:ext uri="{FF2B5EF4-FFF2-40B4-BE49-F238E27FC236}">
+                  <a16:creationId xmlns:a16="http://schemas.microsoft.com/office/drawing/2014/main" id="{C0341866-E999-4F5D-9485-DA6F69C7CC27}"/>
+                </a:ext>
+              </a:extLst>
+            </p:cNvPr>
+            <p:cNvPicPr>
+              <a:picLocks noChangeAspect="1"/>
+            </p:cNvPicPr>
+            <p:nvPr/>
+          </p:nvPicPr>
+          <p:blipFill>
+            <a:blip r:embed="rId7">
+              <a:extLst>
+                <a:ext uri="{28A0092B-C50C-407E-A947-70E740481C1C}">
+                  <a14:useLocalDpi xmlns:a14="http://schemas.microsoft.com/office/drawing/2010/main" val="0"/>
+                </a:ext>
+              </a:extLst>
+            </a:blip>
+            <a:stretch>
+              <a:fillRect/>
+            </a:stretch>
+          </p:blipFill>
+          <p:spPr>
+            <a:xfrm>
+              <a:off x="3891016" y="3596284"/>
+              <a:ext cx="989708" cy="943153"/>
+            </a:xfrm>
+            <a:prstGeom prst="rect">
+              <a:avLst/>
+            </a:prstGeom>
+          </p:spPr>
+        </p:pic>
+        <p:pic>
+          <p:nvPicPr>
+            <p:cNvPr id="23" name="Imagem 22" descr="Logotipo&#10;&#10;Descrição gerada automaticamente">
+              <a:extLst>
+                <a:ext uri="{FF2B5EF4-FFF2-40B4-BE49-F238E27FC236}">
+                  <a16:creationId xmlns:a16="http://schemas.microsoft.com/office/drawing/2014/main" id="{03A0D43A-9F02-4E13-A31B-F59602FE43FC}"/>
+                </a:ext>
+              </a:extLst>
+            </p:cNvPr>
+            <p:cNvPicPr>
+              <a:picLocks noChangeAspect="1"/>
+            </p:cNvPicPr>
+            <p:nvPr/>
+          </p:nvPicPr>
+          <p:blipFill>
+            <a:blip r:embed="rId8">
+              <a:extLst>
+                <a:ext uri="{28A0092B-C50C-407E-A947-70E740481C1C}">
+                  <a14:useLocalDpi xmlns:a14="http://schemas.microsoft.com/office/drawing/2010/main" val="0"/>
+                </a:ext>
+              </a:extLst>
+            </a:blip>
+            <a:stretch>
+              <a:fillRect/>
+            </a:stretch>
+          </p:blipFill>
+          <p:spPr>
+            <a:xfrm>
+              <a:off x="7037255" y="2996768"/>
+              <a:ext cx="947678" cy="903100"/>
+            </a:xfrm>
+            <a:prstGeom prst="rect">
+              <a:avLst/>
+            </a:prstGeom>
+          </p:spPr>
+        </p:pic>
+      </p:grpSp>
+    </p:spTree>
+    <p:extLst>
+      <p:ext uri="{BB962C8B-B14F-4D97-AF65-F5344CB8AC3E}">
+        <p14:creationId xmlns:p14="http://schemas.microsoft.com/office/powerpoint/2010/main" val="3005838755"/>
       </p:ext>
     </p:extLst>
   </p:cSld>

</xml_diff>